<commit_message>
Thêm các thẻ meta cho SEO
</commit_message>
<xml_diff>
--- a/Facebook/avatar.pptx
+++ b/Facebook/avatar.pptx
@@ -2,19 +2,19 @@
 <file path=ppt/presentation.xml><?xml version="1.0" encoding="utf-8"?>
 <p:presentation xmlns:a="http://schemas.openxmlformats.org/drawingml/2006/main" xmlns:r="http://schemas.openxmlformats.org/officeDocument/2006/relationships" xmlns:p="http://schemas.openxmlformats.org/presentationml/2006/main" saveSubsetFonts="1">
   <p:sldMasterIdLst>
-    <p:sldMasterId id="2147483660" r:id="rId1"/>
+    <p:sldMasterId id="2147483672" r:id="rId1"/>
   </p:sldMasterIdLst>
   <p:sldIdLst>
     <p:sldId id="256" r:id="rId2"/>
   </p:sldIdLst>
-  <p:sldSz cx="2857500" cy="2857500"/>
+  <p:sldSz cx="3600450" cy="3600450"/>
   <p:notesSz cx="6858000" cy="9144000"/>
   <p:defaultTextStyle>
     <a:defPPr>
       <a:defRPr lang="en-US"/>
     </a:defPPr>
-    <a:lvl1pPr marL="0" algn="l" defTabSz="274320" rtl="0" eaLnBrk="1" latinLnBrk="0" hangingPunct="1">
-      <a:defRPr sz="540" kern="1200">
+    <a:lvl1pPr marL="0" algn="l" defTabSz="345643" rtl="0" eaLnBrk="1" latinLnBrk="0" hangingPunct="1">
+      <a:defRPr sz="680" kern="1200">
         <a:solidFill>
           <a:schemeClr val="tx1"/>
         </a:solidFill>
@@ -23,8 +23,8 @@
         <a:cs typeface="+mn-cs"/>
       </a:defRPr>
     </a:lvl1pPr>
-    <a:lvl2pPr marL="137160" algn="l" defTabSz="274320" rtl="0" eaLnBrk="1" latinLnBrk="0" hangingPunct="1">
-      <a:defRPr sz="540" kern="1200">
+    <a:lvl2pPr marL="172822" algn="l" defTabSz="345643" rtl="0" eaLnBrk="1" latinLnBrk="0" hangingPunct="1">
+      <a:defRPr sz="680" kern="1200">
         <a:solidFill>
           <a:schemeClr val="tx1"/>
         </a:solidFill>
@@ -33,8 +33,8 @@
         <a:cs typeface="+mn-cs"/>
       </a:defRPr>
     </a:lvl2pPr>
-    <a:lvl3pPr marL="274320" algn="l" defTabSz="274320" rtl="0" eaLnBrk="1" latinLnBrk="0" hangingPunct="1">
-      <a:defRPr sz="540" kern="1200">
+    <a:lvl3pPr marL="345643" algn="l" defTabSz="345643" rtl="0" eaLnBrk="1" latinLnBrk="0" hangingPunct="1">
+      <a:defRPr sz="680" kern="1200">
         <a:solidFill>
           <a:schemeClr val="tx1"/>
         </a:solidFill>
@@ -43,8 +43,8 @@
         <a:cs typeface="+mn-cs"/>
       </a:defRPr>
     </a:lvl3pPr>
-    <a:lvl4pPr marL="411480" algn="l" defTabSz="274320" rtl="0" eaLnBrk="1" latinLnBrk="0" hangingPunct="1">
-      <a:defRPr sz="540" kern="1200">
+    <a:lvl4pPr marL="518465" algn="l" defTabSz="345643" rtl="0" eaLnBrk="1" latinLnBrk="0" hangingPunct="1">
+      <a:defRPr sz="680" kern="1200">
         <a:solidFill>
           <a:schemeClr val="tx1"/>
         </a:solidFill>
@@ -53,8 +53,8 @@
         <a:cs typeface="+mn-cs"/>
       </a:defRPr>
     </a:lvl4pPr>
-    <a:lvl5pPr marL="548640" algn="l" defTabSz="274320" rtl="0" eaLnBrk="1" latinLnBrk="0" hangingPunct="1">
-      <a:defRPr sz="540" kern="1200">
+    <a:lvl5pPr marL="691286" algn="l" defTabSz="345643" rtl="0" eaLnBrk="1" latinLnBrk="0" hangingPunct="1">
+      <a:defRPr sz="680" kern="1200">
         <a:solidFill>
           <a:schemeClr val="tx1"/>
         </a:solidFill>
@@ -63,8 +63,8 @@
         <a:cs typeface="+mn-cs"/>
       </a:defRPr>
     </a:lvl5pPr>
-    <a:lvl6pPr marL="685800" algn="l" defTabSz="274320" rtl="0" eaLnBrk="1" latinLnBrk="0" hangingPunct="1">
-      <a:defRPr sz="540" kern="1200">
+    <a:lvl6pPr marL="864108" algn="l" defTabSz="345643" rtl="0" eaLnBrk="1" latinLnBrk="0" hangingPunct="1">
+      <a:defRPr sz="680" kern="1200">
         <a:solidFill>
           <a:schemeClr val="tx1"/>
         </a:solidFill>
@@ -73,8 +73,8 @@
         <a:cs typeface="+mn-cs"/>
       </a:defRPr>
     </a:lvl6pPr>
-    <a:lvl7pPr marL="822960" algn="l" defTabSz="274320" rtl="0" eaLnBrk="1" latinLnBrk="0" hangingPunct="1">
-      <a:defRPr sz="540" kern="1200">
+    <a:lvl7pPr marL="1036930" algn="l" defTabSz="345643" rtl="0" eaLnBrk="1" latinLnBrk="0" hangingPunct="1">
+      <a:defRPr sz="680" kern="1200">
         <a:solidFill>
           <a:schemeClr val="tx1"/>
         </a:solidFill>
@@ -83,8 +83,8 @@
         <a:cs typeface="+mn-cs"/>
       </a:defRPr>
     </a:lvl7pPr>
-    <a:lvl8pPr marL="960120" algn="l" defTabSz="274320" rtl="0" eaLnBrk="1" latinLnBrk="0" hangingPunct="1">
-      <a:defRPr sz="540" kern="1200">
+    <a:lvl8pPr marL="1209751" algn="l" defTabSz="345643" rtl="0" eaLnBrk="1" latinLnBrk="0" hangingPunct="1">
+      <a:defRPr sz="680" kern="1200">
         <a:solidFill>
           <a:schemeClr val="tx1"/>
         </a:solidFill>
@@ -93,8 +93,8 @@
         <a:cs typeface="+mn-cs"/>
       </a:defRPr>
     </a:lvl8pPr>
-    <a:lvl9pPr marL="1097280" algn="l" defTabSz="274320" rtl="0" eaLnBrk="1" latinLnBrk="0" hangingPunct="1">
-      <a:defRPr sz="540" kern="1200">
+    <a:lvl9pPr marL="1382573" algn="l" defTabSz="345643" rtl="0" eaLnBrk="1" latinLnBrk="0" hangingPunct="1">
+      <a:defRPr sz="680" kern="1200">
         <a:solidFill>
           <a:schemeClr val="tx1"/>
         </a:solidFill>
@@ -104,6 +104,11 @@
       </a:defRPr>
     </a:lvl9pPr>
   </p:defaultTextStyle>
+  <p:extLst>
+    <p:ext uri="{EFAFB233-063F-42B5-8137-9DF3F51BA10A}">
+      <p15:sldGuideLst xmlns:p15="http://schemas.microsoft.com/office/powerpoint/2012/main"/>
+    </p:ext>
+  </p:extLst>
 </p:presentation>
 </file>
 
@@ -136,15 +141,15 @@
         </p:nvSpPr>
         <p:spPr>
           <a:xfrm>
-            <a:off x="214313" y="467651"/>
-            <a:ext cx="2428875" cy="994833"/>
+            <a:off x="270034" y="589241"/>
+            <a:ext cx="3060383" cy="1253490"/>
           </a:xfrm>
         </p:spPr>
         <p:txBody>
           <a:bodyPr anchor="b"/>
           <a:lstStyle>
             <a:lvl1pPr algn="ctr">
-              <a:defRPr sz="1875"/>
+              <a:defRPr sz="2363"/>
             </a:lvl1pPr>
           </a:lstStyle>
           <a:p>
@@ -168,8 +173,8 @@
         </p:nvSpPr>
         <p:spPr>
           <a:xfrm>
-            <a:off x="357188" y="1500849"/>
-            <a:ext cx="2143125" cy="689901"/>
+            <a:off x="450056" y="1891070"/>
+            <a:ext cx="2700338" cy="869275"/>
           </a:xfrm>
         </p:spPr>
         <p:txBody>
@@ -177,39 +182,39 @@
           <a:lstStyle>
             <a:lvl1pPr marL="0" indent="0" algn="ctr">
               <a:buNone/>
-              <a:defRPr sz="750"/>
+              <a:defRPr sz="945"/>
             </a:lvl1pPr>
-            <a:lvl2pPr marL="142875" indent="0" algn="ctr">
-              <a:buNone/>
-              <a:defRPr sz="625"/>
+            <a:lvl2pPr marL="180045" indent="0" algn="ctr">
+              <a:buNone/>
+              <a:defRPr sz="788"/>
             </a:lvl2pPr>
-            <a:lvl3pPr marL="285750" indent="0" algn="ctr">
-              <a:buNone/>
-              <a:defRPr sz="563"/>
+            <a:lvl3pPr marL="360091" indent="0" algn="ctr">
+              <a:buNone/>
+              <a:defRPr sz="709"/>
             </a:lvl3pPr>
-            <a:lvl4pPr marL="428625" indent="0" algn="ctr">
-              <a:buNone/>
-              <a:defRPr sz="500"/>
+            <a:lvl4pPr marL="540136" indent="0" algn="ctr">
+              <a:buNone/>
+              <a:defRPr sz="630"/>
             </a:lvl4pPr>
-            <a:lvl5pPr marL="571500" indent="0" algn="ctr">
-              <a:buNone/>
-              <a:defRPr sz="500"/>
+            <a:lvl5pPr marL="720181" indent="0" algn="ctr">
+              <a:buNone/>
+              <a:defRPr sz="630"/>
             </a:lvl5pPr>
-            <a:lvl6pPr marL="714375" indent="0" algn="ctr">
-              <a:buNone/>
-              <a:defRPr sz="500"/>
+            <a:lvl6pPr marL="900227" indent="0" algn="ctr">
+              <a:buNone/>
+              <a:defRPr sz="630"/>
             </a:lvl6pPr>
-            <a:lvl7pPr marL="857250" indent="0" algn="ctr">
-              <a:buNone/>
-              <a:defRPr sz="500"/>
+            <a:lvl7pPr marL="1080272" indent="0" algn="ctr">
+              <a:buNone/>
+              <a:defRPr sz="630"/>
             </a:lvl7pPr>
-            <a:lvl8pPr marL="1000125" indent="0" algn="ctr">
-              <a:buNone/>
-              <a:defRPr sz="500"/>
+            <a:lvl8pPr marL="1260318" indent="0" algn="ctr">
+              <a:buNone/>
+              <a:defRPr sz="630"/>
             </a:lvl8pPr>
-            <a:lvl9pPr marL="1143000" indent="0" algn="ctr">
-              <a:buNone/>
-              <a:defRPr sz="500"/>
+            <a:lvl9pPr marL="1440363" indent="0" algn="ctr">
+              <a:buNone/>
+              <a:defRPr sz="630"/>
             </a:lvl9pPr>
           </a:lstStyle>
           <a:p>
@@ -238,7 +243,7 @@
           <a:p>
             <a:fld id="{5389BAA2-ACBC-4759-A821-F5A5AC4AC9AB}" type="datetimeFigureOut">
               <a:rPr lang="en-US" smtClean="0"/>
-              <a:t>9/9/2018</a:t>
+              <a:t>9/26/2018</a:t>
             </a:fld>
             <a:endParaRPr lang="en-US"/>
           </a:p>
@@ -289,7 +294,7 @@
     </p:spTree>
     <p:extLst>
       <p:ext uri="{BB962C8B-B14F-4D97-AF65-F5344CB8AC3E}">
-        <p14:creationId xmlns:p14="http://schemas.microsoft.com/office/powerpoint/2010/main" val="2887607096"/>
+        <p14:creationId xmlns:p14="http://schemas.microsoft.com/office/powerpoint/2010/main" val="3281445631"/>
       </p:ext>
     </p:extLst>
   </p:cSld>
@@ -408,7 +413,7 @@
           <a:p>
             <a:fld id="{5389BAA2-ACBC-4759-A821-F5A5AC4AC9AB}" type="datetimeFigureOut">
               <a:rPr lang="en-US" smtClean="0"/>
-              <a:t>9/9/2018</a:t>
+              <a:t>9/26/2018</a:t>
             </a:fld>
             <a:endParaRPr lang="en-US"/>
           </a:p>
@@ -459,7 +464,7 @@
     </p:spTree>
     <p:extLst>
       <p:ext uri="{BB962C8B-B14F-4D97-AF65-F5344CB8AC3E}">
-        <p14:creationId xmlns:p14="http://schemas.microsoft.com/office/powerpoint/2010/main" val="1037677486"/>
+        <p14:creationId xmlns:p14="http://schemas.microsoft.com/office/powerpoint/2010/main" val="552456825"/>
       </p:ext>
     </p:extLst>
   </p:cSld>
@@ -498,8 +503,8 @@
         </p:nvSpPr>
         <p:spPr>
           <a:xfrm>
-            <a:off x="2044899" y="152136"/>
-            <a:ext cx="616148" cy="2421599"/>
+            <a:off x="2576572" y="191691"/>
+            <a:ext cx="776347" cy="3051215"/>
           </a:xfrm>
         </p:spPr>
         <p:txBody>
@@ -526,8 +531,8 @@
         </p:nvSpPr>
         <p:spPr>
           <a:xfrm>
-            <a:off x="196453" y="152136"/>
-            <a:ext cx="1812727" cy="2421599"/>
+            <a:off x="247531" y="191691"/>
+            <a:ext cx="2284035" cy="3051215"/>
           </a:xfrm>
         </p:spPr>
         <p:txBody>
@@ -588,7 +593,7 @@
           <a:p>
             <a:fld id="{5389BAA2-ACBC-4759-A821-F5A5AC4AC9AB}" type="datetimeFigureOut">
               <a:rPr lang="en-US" smtClean="0"/>
-              <a:t>9/9/2018</a:t>
+              <a:t>9/26/2018</a:t>
             </a:fld>
             <a:endParaRPr lang="en-US"/>
           </a:p>
@@ -639,7 +644,7 @@
     </p:spTree>
     <p:extLst>
       <p:ext uri="{BB962C8B-B14F-4D97-AF65-F5344CB8AC3E}">
-        <p14:creationId xmlns:p14="http://schemas.microsoft.com/office/powerpoint/2010/main" val="726546543"/>
+        <p14:creationId xmlns:p14="http://schemas.microsoft.com/office/powerpoint/2010/main" val="4197419106"/>
       </p:ext>
     </p:extLst>
   </p:cSld>
@@ -758,7 +763,7 @@
           <a:p>
             <a:fld id="{5389BAA2-ACBC-4759-A821-F5A5AC4AC9AB}" type="datetimeFigureOut">
               <a:rPr lang="en-US" smtClean="0"/>
-              <a:t>9/9/2018</a:t>
+              <a:t>9/26/2018</a:t>
             </a:fld>
             <a:endParaRPr lang="en-US"/>
           </a:p>
@@ -809,7 +814,7 @@
     </p:spTree>
     <p:extLst>
       <p:ext uri="{BB962C8B-B14F-4D97-AF65-F5344CB8AC3E}">
-        <p14:creationId xmlns:p14="http://schemas.microsoft.com/office/powerpoint/2010/main" val="878172860"/>
+        <p14:creationId xmlns:p14="http://schemas.microsoft.com/office/powerpoint/2010/main" val="3168579766"/>
       </p:ext>
     </p:extLst>
   </p:cSld>
@@ -848,15 +853,15 @@
         </p:nvSpPr>
         <p:spPr>
           <a:xfrm>
-            <a:off x="194965" y="712392"/>
-            <a:ext cx="2464594" cy="1188640"/>
+            <a:off x="245656" y="897613"/>
+            <a:ext cx="3105388" cy="1497687"/>
           </a:xfrm>
         </p:spPr>
         <p:txBody>
           <a:bodyPr anchor="b"/>
           <a:lstStyle>
             <a:lvl1pPr>
-              <a:defRPr sz="1875"/>
+              <a:defRPr sz="2363"/>
             </a:lvl1pPr>
           </a:lstStyle>
           <a:p>
@@ -880,8 +885,8 @@
         </p:nvSpPr>
         <p:spPr>
           <a:xfrm>
-            <a:off x="194965" y="1912277"/>
-            <a:ext cx="2464594" cy="625078"/>
+            <a:off x="245656" y="2409469"/>
+            <a:ext cx="3105388" cy="787598"/>
           </a:xfrm>
         </p:spPr>
         <p:txBody>
@@ -889,15 +894,15 @@
           <a:lstStyle>
             <a:lvl1pPr marL="0" indent="0">
               <a:buNone/>
-              <a:defRPr sz="750">
+              <a:defRPr sz="945">
                 <a:solidFill>
                   <a:schemeClr val="tx1"/>
                 </a:solidFill>
               </a:defRPr>
             </a:lvl1pPr>
-            <a:lvl2pPr marL="142875" indent="0">
-              <a:buNone/>
-              <a:defRPr sz="625">
+            <a:lvl2pPr marL="180045" indent="0">
+              <a:buNone/>
+              <a:defRPr sz="788">
                 <a:solidFill>
                   <a:schemeClr val="tx1">
                     <a:tint val="75000"/>
@@ -905,9 +910,9 @@
                 </a:solidFill>
               </a:defRPr>
             </a:lvl2pPr>
-            <a:lvl3pPr marL="285750" indent="0">
-              <a:buNone/>
-              <a:defRPr sz="563">
+            <a:lvl3pPr marL="360091" indent="0">
+              <a:buNone/>
+              <a:defRPr sz="709">
                 <a:solidFill>
                   <a:schemeClr val="tx1">
                     <a:tint val="75000"/>
@@ -915,9 +920,9 @@
                 </a:solidFill>
               </a:defRPr>
             </a:lvl3pPr>
-            <a:lvl4pPr marL="428625" indent="0">
-              <a:buNone/>
-              <a:defRPr sz="500">
+            <a:lvl4pPr marL="540136" indent="0">
+              <a:buNone/>
+              <a:defRPr sz="630">
                 <a:solidFill>
                   <a:schemeClr val="tx1">
                     <a:tint val="75000"/>
@@ -925,9 +930,9 @@
                 </a:solidFill>
               </a:defRPr>
             </a:lvl4pPr>
-            <a:lvl5pPr marL="571500" indent="0">
-              <a:buNone/>
-              <a:defRPr sz="500">
+            <a:lvl5pPr marL="720181" indent="0">
+              <a:buNone/>
+              <a:defRPr sz="630">
                 <a:solidFill>
                   <a:schemeClr val="tx1">
                     <a:tint val="75000"/>
@@ -935,9 +940,9 @@
                 </a:solidFill>
               </a:defRPr>
             </a:lvl5pPr>
-            <a:lvl6pPr marL="714375" indent="0">
-              <a:buNone/>
-              <a:defRPr sz="500">
+            <a:lvl6pPr marL="900227" indent="0">
+              <a:buNone/>
+              <a:defRPr sz="630">
                 <a:solidFill>
                   <a:schemeClr val="tx1">
                     <a:tint val="75000"/>
@@ -945,9 +950,9 @@
                 </a:solidFill>
               </a:defRPr>
             </a:lvl6pPr>
-            <a:lvl7pPr marL="857250" indent="0">
-              <a:buNone/>
-              <a:defRPr sz="500">
+            <a:lvl7pPr marL="1080272" indent="0">
+              <a:buNone/>
+              <a:defRPr sz="630">
                 <a:solidFill>
                   <a:schemeClr val="tx1">
                     <a:tint val="75000"/>
@@ -955,9 +960,9 @@
                 </a:solidFill>
               </a:defRPr>
             </a:lvl7pPr>
-            <a:lvl8pPr marL="1000125" indent="0">
-              <a:buNone/>
-              <a:defRPr sz="500">
+            <a:lvl8pPr marL="1260318" indent="0">
+              <a:buNone/>
+              <a:defRPr sz="630">
                 <a:solidFill>
                   <a:schemeClr val="tx1">
                     <a:tint val="75000"/>
@@ -965,9 +970,9 @@
                 </a:solidFill>
               </a:defRPr>
             </a:lvl8pPr>
-            <a:lvl9pPr marL="1143000" indent="0">
-              <a:buNone/>
-              <a:defRPr sz="500">
+            <a:lvl9pPr marL="1440363" indent="0">
+              <a:buNone/>
+              <a:defRPr sz="630">
                 <a:solidFill>
                   <a:schemeClr val="tx1">
                     <a:tint val="75000"/>
@@ -1002,7 +1007,7 @@
           <a:p>
             <a:fld id="{5389BAA2-ACBC-4759-A821-F5A5AC4AC9AB}" type="datetimeFigureOut">
               <a:rPr lang="en-US" smtClean="0"/>
-              <a:t>9/9/2018</a:t>
+              <a:t>9/26/2018</a:t>
             </a:fld>
             <a:endParaRPr lang="en-US"/>
           </a:p>
@@ -1053,7 +1058,7 @@
     </p:spTree>
     <p:extLst>
       <p:ext uri="{BB962C8B-B14F-4D97-AF65-F5344CB8AC3E}">
-        <p14:creationId xmlns:p14="http://schemas.microsoft.com/office/powerpoint/2010/main" val="2484133976"/>
+        <p14:creationId xmlns:p14="http://schemas.microsoft.com/office/powerpoint/2010/main" val="3153883600"/>
       </p:ext>
     </p:extLst>
   </p:cSld>
@@ -1115,8 +1120,8 @@
         </p:nvSpPr>
         <p:spPr>
           <a:xfrm>
-            <a:off x="196453" y="760677"/>
-            <a:ext cx="1214438" cy="1813058"/>
+            <a:off x="247531" y="958453"/>
+            <a:ext cx="1530191" cy="2284452"/>
           </a:xfrm>
         </p:spPr>
         <p:txBody>
@@ -1172,8 +1177,8 @@
         </p:nvSpPr>
         <p:spPr>
           <a:xfrm>
-            <a:off x="1446609" y="760677"/>
-            <a:ext cx="1214438" cy="1813058"/>
+            <a:off x="1822728" y="958453"/>
+            <a:ext cx="1530191" cy="2284452"/>
           </a:xfrm>
         </p:spPr>
         <p:txBody>
@@ -1234,7 +1239,7 @@
           <a:p>
             <a:fld id="{5389BAA2-ACBC-4759-A821-F5A5AC4AC9AB}" type="datetimeFigureOut">
               <a:rPr lang="en-US" smtClean="0"/>
-              <a:t>9/9/2018</a:t>
+              <a:t>9/26/2018</a:t>
             </a:fld>
             <a:endParaRPr lang="en-US"/>
           </a:p>
@@ -1285,7 +1290,7 @@
     </p:spTree>
     <p:extLst>
       <p:ext uri="{BB962C8B-B14F-4D97-AF65-F5344CB8AC3E}">
-        <p14:creationId xmlns:p14="http://schemas.microsoft.com/office/powerpoint/2010/main" val="1218531490"/>
+        <p14:creationId xmlns:p14="http://schemas.microsoft.com/office/powerpoint/2010/main" val="916333713"/>
       </p:ext>
     </p:extLst>
   </p:cSld>
@@ -1324,8 +1329,8 @@
         </p:nvSpPr>
         <p:spPr>
           <a:xfrm>
-            <a:off x="196825" y="152136"/>
-            <a:ext cx="2464594" cy="552318"/>
+            <a:off x="248000" y="191691"/>
+            <a:ext cx="3105388" cy="695921"/>
           </a:xfrm>
         </p:spPr>
         <p:txBody>
@@ -1352,8 +1357,8 @@
         </p:nvSpPr>
         <p:spPr>
           <a:xfrm>
-            <a:off x="196826" y="700484"/>
-            <a:ext cx="1208856" cy="343297"/>
+            <a:off x="248000" y="882610"/>
+            <a:ext cx="1523159" cy="432554"/>
           </a:xfrm>
         </p:spPr>
         <p:txBody>
@@ -1361,39 +1366,39 @@
           <a:lstStyle>
             <a:lvl1pPr marL="0" indent="0">
               <a:buNone/>
-              <a:defRPr sz="750" b="1"/>
+              <a:defRPr sz="945" b="1"/>
             </a:lvl1pPr>
-            <a:lvl2pPr marL="142875" indent="0">
-              <a:buNone/>
-              <a:defRPr sz="625" b="1"/>
+            <a:lvl2pPr marL="180045" indent="0">
+              <a:buNone/>
+              <a:defRPr sz="788" b="1"/>
             </a:lvl2pPr>
-            <a:lvl3pPr marL="285750" indent="0">
-              <a:buNone/>
-              <a:defRPr sz="563" b="1"/>
+            <a:lvl3pPr marL="360091" indent="0">
+              <a:buNone/>
+              <a:defRPr sz="709" b="1"/>
             </a:lvl3pPr>
-            <a:lvl4pPr marL="428625" indent="0">
-              <a:buNone/>
-              <a:defRPr sz="500" b="1"/>
+            <a:lvl4pPr marL="540136" indent="0">
+              <a:buNone/>
+              <a:defRPr sz="630" b="1"/>
             </a:lvl4pPr>
-            <a:lvl5pPr marL="571500" indent="0">
-              <a:buNone/>
-              <a:defRPr sz="500" b="1"/>
+            <a:lvl5pPr marL="720181" indent="0">
+              <a:buNone/>
+              <a:defRPr sz="630" b="1"/>
             </a:lvl5pPr>
-            <a:lvl6pPr marL="714375" indent="0">
-              <a:buNone/>
-              <a:defRPr sz="500" b="1"/>
+            <a:lvl6pPr marL="900227" indent="0">
+              <a:buNone/>
+              <a:defRPr sz="630" b="1"/>
             </a:lvl6pPr>
-            <a:lvl7pPr marL="857250" indent="0">
-              <a:buNone/>
-              <a:defRPr sz="500" b="1"/>
+            <a:lvl7pPr marL="1080272" indent="0">
+              <a:buNone/>
+              <a:defRPr sz="630" b="1"/>
             </a:lvl7pPr>
-            <a:lvl8pPr marL="1000125" indent="0">
-              <a:buNone/>
-              <a:defRPr sz="500" b="1"/>
+            <a:lvl8pPr marL="1260318" indent="0">
+              <a:buNone/>
+              <a:defRPr sz="630" b="1"/>
             </a:lvl8pPr>
-            <a:lvl9pPr marL="1143000" indent="0">
-              <a:buNone/>
-              <a:defRPr sz="500" b="1"/>
+            <a:lvl9pPr marL="1440363" indent="0">
+              <a:buNone/>
+              <a:defRPr sz="630" b="1"/>
             </a:lvl9pPr>
           </a:lstStyle>
           <a:p>
@@ -1417,8 +1422,8 @@
         </p:nvSpPr>
         <p:spPr>
           <a:xfrm>
-            <a:off x="196826" y="1043781"/>
-            <a:ext cx="1208856" cy="1535245"/>
+            <a:off x="248000" y="1315164"/>
+            <a:ext cx="1523159" cy="1934409"/>
           </a:xfrm>
         </p:spPr>
         <p:txBody>
@@ -1474,8 +1479,8 @@
         </p:nvSpPr>
         <p:spPr>
           <a:xfrm>
-            <a:off x="1446609" y="700484"/>
-            <a:ext cx="1214810" cy="343297"/>
+            <a:off x="1822728" y="882610"/>
+            <a:ext cx="1530660" cy="432554"/>
           </a:xfrm>
         </p:spPr>
         <p:txBody>
@@ -1483,39 +1488,39 @@
           <a:lstStyle>
             <a:lvl1pPr marL="0" indent="0">
               <a:buNone/>
-              <a:defRPr sz="750" b="1"/>
+              <a:defRPr sz="945" b="1"/>
             </a:lvl1pPr>
-            <a:lvl2pPr marL="142875" indent="0">
-              <a:buNone/>
-              <a:defRPr sz="625" b="1"/>
+            <a:lvl2pPr marL="180045" indent="0">
+              <a:buNone/>
+              <a:defRPr sz="788" b="1"/>
             </a:lvl2pPr>
-            <a:lvl3pPr marL="285750" indent="0">
-              <a:buNone/>
-              <a:defRPr sz="563" b="1"/>
+            <a:lvl3pPr marL="360091" indent="0">
+              <a:buNone/>
+              <a:defRPr sz="709" b="1"/>
             </a:lvl3pPr>
-            <a:lvl4pPr marL="428625" indent="0">
-              <a:buNone/>
-              <a:defRPr sz="500" b="1"/>
+            <a:lvl4pPr marL="540136" indent="0">
+              <a:buNone/>
+              <a:defRPr sz="630" b="1"/>
             </a:lvl4pPr>
-            <a:lvl5pPr marL="571500" indent="0">
-              <a:buNone/>
-              <a:defRPr sz="500" b="1"/>
+            <a:lvl5pPr marL="720181" indent="0">
+              <a:buNone/>
+              <a:defRPr sz="630" b="1"/>
             </a:lvl5pPr>
-            <a:lvl6pPr marL="714375" indent="0">
-              <a:buNone/>
-              <a:defRPr sz="500" b="1"/>
+            <a:lvl6pPr marL="900227" indent="0">
+              <a:buNone/>
+              <a:defRPr sz="630" b="1"/>
             </a:lvl6pPr>
-            <a:lvl7pPr marL="857250" indent="0">
-              <a:buNone/>
-              <a:defRPr sz="500" b="1"/>
+            <a:lvl7pPr marL="1080272" indent="0">
+              <a:buNone/>
+              <a:defRPr sz="630" b="1"/>
             </a:lvl7pPr>
-            <a:lvl8pPr marL="1000125" indent="0">
-              <a:buNone/>
-              <a:defRPr sz="500" b="1"/>
+            <a:lvl8pPr marL="1260318" indent="0">
+              <a:buNone/>
+              <a:defRPr sz="630" b="1"/>
             </a:lvl8pPr>
-            <a:lvl9pPr marL="1143000" indent="0">
-              <a:buNone/>
-              <a:defRPr sz="500" b="1"/>
+            <a:lvl9pPr marL="1440363" indent="0">
+              <a:buNone/>
+              <a:defRPr sz="630" b="1"/>
             </a:lvl9pPr>
           </a:lstStyle>
           <a:p>
@@ -1539,8 +1544,8 @@
         </p:nvSpPr>
         <p:spPr>
           <a:xfrm>
-            <a:off x="1446609" y="1043781"/>
-            <a:ext cx="1214810" cy="1535245"/>
+            <a:off x="1822728" y="1315164"/>
+            <a:ext cx="1530660" cy="1934409"/>
           </a:xfrm>
         </p:spPr>
         <p:txBody>
@@ -1601,7 +1606,7 @@
           <a:p>
             <a:fld id="{5389BAA2-ACBC-4759-A821-F5A5AC4AC9AB}" type="datetimeFigureOut">
               <a:rPr lang="en-US" smtClean="0"/>
-              <a:t>9/9/2018</a:t>
+              <a:t>9/26/2018</a:t>
             </a:fld>
             <a:endParaRPr lang="en-US"/>
           </a:p>
@@ -1652,7 +1657,7 @@
     </p:spTree>
     <p:extLst>
       <p:ext uri="{BB962C8B-B14F-4D97-AF65-F5344CB8AC3E}">
-        <p14:creationId xmlns:p14="http://schemas.microsoft.com/office/powerpoint/2010/main" val="252593936"/>
+        <p14:creationId xmlns:p14="http://schemas.microsoft.com/office/powerpoint/2010/main" val="415292239"/>
       </p:ext>
     </p:extLst>
   </p:cSld>
@@ -1719,7 +1724,7 @@
           <a:p>
             <a:fld id="{5389BAA2-ACBC-4759-A821-F5A5AC4AC9AB}" type="datetimeFigureOut">
               <a:rPr lang="en-US" smtClean="0"/>
-              <a:t>9/9/2018</a:t>
+              <a:t>9/26/2018</a:t>
             </a:fld>
             <a:endParaRPr lang="en-US"/>
           </a:p>
@@ -1770,7 +1775,7 @@
     </p:spTree>
     <p:extLst>
       <p:ext uri="{BB962C8B-B14F-4D97-AF65-F5344CB8AC3E}">
-        <p14:creationId xmlns:p14="http://schemas.microsoft.com/office/powerpoint/2010/main" val="1667883051"/>
+        <p14:creationId xmlns:p14="http://schemas.microsoft.com/office/powerpoint/2010/main" val="203385355"/>
       </p:ext>
     </p:extLst>
   </p:cSld>
@@ -1814,7 +1819,7 @@
           <a:p>
             <a:fld id="{5389BAA2-ACBC-4759-A821-F5A5AC4AC9AB}" type="datetimeFigureOut">
               <a:rPr lang="en-US" smtClean="0"/>
-              <a:t>9/9/2018</a:t>
+              <a:t>9/26/2018</a:t>
             </a:fld>
             <a:endParaRPr lang="en-US"/>
           </a:p>
@@ -1865,7 +1870,7 @@
     </p:spTree>
     <p:extLst>
       <p:ext uri="{BB962C8B-B14F-4D97-AF65-F5344CB8AC3E}">
-        <p14:creationId xmlns:p14="http://schemas.microsoft.com/office/powerpoint/2010/main" val="1841353436"/>
+        <p14:creationId xmlns:p14="http://schemas.microsoft.com/office/powerpoint/2010/main" val="2432511662"/>
       </p:ext>
     </p:extLst>
   </p:cSld>
@@ -1904,15 +1909,15 @@
         </p:nvSpPr>
         <p:spPr>
           <a:xfrm>
-            <a:off x="196825" y="190500"/>
-            <a:ext cx="921618" cy="666750"/>
+            <a:off x="248000" y="240030"/>
+            <a:ext cx="1161239" cy="840105"/>
           </a:xfrm>
         </p:spPr>
         <p:txBody>
           <a:bodyPr anchor="b"/>
           <a:lstStyle>
             <a:lvl1pPr>
-              <a:defRPr sz="1000"/>
+              <a:defRPr sz="1260"/>
             </a:lvl1pPr>
           </a:lstStyle>
           <a:p>
@@ -1936,39 +1941,39 @@
         </p:nvSpPr>
         <p:spPr>
           <a:xfrm>
-            <a:off x="1214810" y="411428"/>
-            <a:ext cx="1446609" cy="2030677"/>
+            <a:off x="1530660" y="518399"/>
+            <a:ext cx="1822728" cy="2558653"/>
           </a:xfrm>
         </p:spPr>
         <p:txBody>
           <a:bodyPr/>
           <a:lstStyle>
             <a:lvl1pPr>
-              <a:defRPr sz="1000"/>
+              <a:defRPr sz="1260"/>
             </a:lvl1pPr>
             <a:lvl2pPr>
-              <a:defRPr sz="875"/>
+              <a:defRPr sz="1103"/>
             </a:lvl2pPr>
             <a:lvl3pPr>
-              <a:defRPr sz="750"/>
+              <a:defRPr sz="945"/>
             </a:lvl3pPr>
             <a:lvl4pPr>
-              <a:defRPr sz="625"/>
+              <a:defRPr sz="788"/>
             </a:lvl4pPr>
             <a:lvl5pPr>
-              <a:defRPr sz="625"/>
+              <a:defRPr sz="788"/>
             </a:lvl5pPr>
             <a:lvl6pPr>
-              <a:defRPr sz="625"/>
+              <a:defRPr sz="788"/>
             </a:lvl6pPr>
             <a:lvl7pPr>
-              <a:defRPr sz="625"/>
+              <a:defRPr sz="788"/>
             </a:lvl7pPr>
             <a:lvl8pPr>
-              <a:defRPr sz="625"/>
+              <a:defRPr sz="788"/>
             </a:lvl8pPr>
             <a:lvl9pPr>
-              <a:defRPr sz="625"/>
+              <a:defRPr sz="788"/>
             </a:lvl9pPr>
           </a:lstStyle>
           <a:p>
@@ -2021,8 +2026,8 @@
         </p:nvSpPr>
         <p:spPr>
           <a:xfrm>
-            <a:off x="196825" y="857250"/>
-            <a:ext cx="921618" cy="1588162"/>
+            <a:off x="248000" y="1080135"/>
+            <a:ext cx="1161239" cy="2001084"/>
           </a:xfrm>
         </p:spPr>
         <p:txBody>
@@ -2030,39 +2035,39 @@
           <a:lstStyle>
             <a:lvl1pPr marL="0" indent="0">
               <a:buNone/>
-              <a:defRPr sz="500"/>
+              <a:defRPr sz="630"/>
             </a:lvl1pPr>
-            <a:lvl2pPr marL="142875" indent="0">
-              <a:buNone/>
-              <a:defRPr sz="438"/>
+            <a:lvl2pPr marL="180045" indent="0">
+              <a:buNone/>
+              <a:defRPr sz="551"/>
             </a:lvl2pPr>
-            <a:lvl3pPr marL="285750" indent="0">
-              <a:buNone/>
-              <a:defRPr sz="375"/>
+            <a:lvl3pPr marL="360091" indent="0">
+              <a:buNone/>
+              <a:defRPr sz="473"/>
             </a:lvl3pPr>
-            <a:lvl4pPr marL="428625" indent="0">
-              <a:buNone/>
-              <a:defRPr sz="313"/>
+            <a:lvl4pPr marL="540136" indent="0">
+              <a:buNone/>
+              <a:defRPr sz="394"/>
             </a:lvl4pPr>
-            <a:lvl5pPr marL="571500" indent="0">
-              <a:buNone/>
-              <a:defRPr sz="313"/>
+            <a:lvl5pPr marL="720181" indent="0">
+              <a:buNone/>
+              <a:defRPr sz="394"/>
             </a:lvl5pPr>
-            <a:lvl6pPr marL="714375" indent="0">
-              <a:buNone/>
-              <a:defRPr sz="313"/>
+            <a:lvl6pPr marL="900227" indent="0">
+              <a:buNone/>
+              <a:defRPr sz="394"/>
             </a:lvl6pPr>
-            <a:lvl7pPr marL="857250" indent="0">
-              <a:buNone/>
-              <a:defRPr sz="313"/>
+            <a:lvl7pPr marL="1080272" indent="0">
+              <a:buNone/>
+              <a:defRPr sz="394"/>
             </a:lvl7pPr>
-            <a:lvl8pPr marL="1000125" indent="0">
-              <a:buNone/>
-              <a:defRPr sz="313"/>
+            <a:lvl8pPr marL="1260318" indent="0">
+              <a:buNone/>
+              <a:defRPr sz="394"/>
             </a:lvl8pPr>
-            <a:lvl9pPr marL="1143000" indent="0">
-              <a:buNone/>
-              <a:defRPr sz="313"/>
+            <a:lvl9pPr marL="1440363" indent="0">
+              <a:buNone/>
+              <a:defRPr sz="394"/>
             </a:lvl9pPr>
           </a:lstStyle>
           <a:p>
@@ -2091,7 +2096,7 @@
           <a:p>
             <a:fld id="{5389BAA2-ACBC-4759-A821-F5A5AC4AC9AB}" type="datetimeFigureOut">
               <a:rPr lang="en-US" smtClean="0"/>
-              <a:t>9/9/2018</a:t>
+              <a:t>9/26/2018</a:t>
             </a:fld>
             <a:endParaRPr lang="en-US"/>
           </a:p>
@@ -2142,7 +2147,7 @@
     </p:spTree>
     <p:extLst>
       <p:ext uri="{BB962C8B-B14F-4D97-AF65-F5344CB8AC3E}">
-        <p14:creationId xmlns:p14="http://schemas.microsoft.com/office/powerpoint/2010/main" val="3580925646"/>
+        <p14:creationId xmlns:p14="http://schemas.microsoft.com/office/powerpoint/2010/main" val="2350994578"/>
       </p:ext>
     </p:extLst>
   </p:cSld>
@@ -2181,15 +2186,15 @@
         </p:nvSpPr>
         <p:spPr>
           <a:xfrm>
-            <a:off x="196825" y="190500"/>
-            <a:ext cx="921618" cy="666750"/>
+            <a:off x="248000" y="240030"/>
+            <a:ext cx="1161239" cy="840105"/>
           </a:xfrm>
         </p:spPr>
         <p:txBody>
           <a:bodyPr anchor="b"/>
           <a:lstStyle>
             <a:lvl1pPr>
-              <a:defRPr sz="1000"/>
+              <a:defRPr sz="1260"/>
             </a:lvl1pPr>
           </a:lstStyle>
           <a:p>
@@ -2213,8 +2218,8 @@
         </p:nvSpPr>
         <p:spPr>
           <a:xfrm>
-            <a:off x="1214810" y="411428"/>
-            <a:ext cx="1446609" cy="2030677"/>
+            <a:off x="1530660" y="518399"/>
+            <a:ext cx="1822728" cy="2558653"/>
           </a:xfrm>
         </p:spPr>
         <p:txBody>
@@ -2222,39 +2227,39 @@
           <a:lstStyle>
             <a:lvl1pPr marL="0" indent="0">
               <a:buNone/>
-              <a:defRPr sz="1000"/>
+              <a:defRPr sz="1260"/>
             </a:lvl1pPr>
-            <a:lvl2pPr marL="142875" indent="0">
-              <a:buNone/>
-              <a:defRPr sz="875"/>
+            <a:lvl2pPr marL="180045" indent="0">
+              <a:buNone/>
+              <a:defRPr sz="1103"/>
             </a:lvl2pPr>
-            <a:lvl3pPr marL="285750" indent="0">
-              <a:buNone/>
-              <a:defRPr sz="750"/>
+            <a:lvl3pPr marL="360091" indent="0">
+              <a:buNone/>
+              <a:defRPr sz="945"/>
             </a:lvl3pPr>
-            <a:lvl4pPr marL="428625" indent="0">
-              <a:buNone/>
-              <a:defRPr sz="625"/>
+            <a:lvl4pPr marL="540136" indent="0">
+              <a:buNone/>
+              <a:defRPr sz="788"/>
             </a:lvl4pPr>
-            <a:lvl5pPr marL="571500" indent="0">
-              <a:buNone/>
-              <a:defRPr sz="625"/>
+            <a:lvl5pPr marL="720181" indent="0">
+              <a:buNone/>
+              <a:defRPr sz="788"/>
             </a:lvl5pPr>
-            <a:lvl6pPr marL="714375" indent="0">
-              <a:buNone/>
-              <a:defRPr sz="625"/>
+            <a:lvl6pPr marL="900227" indent="0">
+              <a:buNone/>
+              <a:defRPr sz="788"/>
             </a:lvl6pPr>
-            <a:lvl7pPr marL="857250" indent="0">
-              <a:buNone/>
-              <a:defRPr sz="625"/>
+            <a:lvl7pPr marL="1080272" indent="0">
+              <a:buNone/>
+              <a:defRPr sz="788"/>
             </a:lvl7pPr>
-            <a:lvl8pPr marL="1000125" indent="0">
-              <a:buNone/>
-              <a:defRPr sz="625"/>
+            <a:lvl8pPr marL="1260318" indent="0">
+              <a:buNone/>
+              <a:defRPr sz="788"/>
             </a:lvl8pPr>
-            <a:lvl9pPr marL="1143000" indent="0">
-              <a:buNone/>
-              <a:defRPr sz="625"/>
+            <a:lvl9pPr marL="1440363" indent="0">
+              <a:buNone/>
+              <a:defRPr sz="788"/>
             </a:lvl9pPr>
           </a:lstStyle>
           <a:p>
@@ -2278,8 +2283,8 @@
         </p:nvSpPr>
         <p:spPr>
           <a:xfrm>
-            <a:off x="196825" y="857250"/>
-            <a:ext cx="921618" cy="1588162"/>
+            <a:off x="248000" y="1080135"/>
+            <a:ext cx="1161239" cy="2001084"/>
           </a:xfrm>
         </p:spPr>
         <p:txBody>
@@ -2287,39 +2292,39 @@
           <a:lstStyle>
             <a:lvl1pPr marL="0" indent="0">
               <a:buNone/>
-              <a:defRPr sz="500"/>
+              <a:defRPr sz="630"/>
             </a:lvl1pPr>
-            <a:lvl2pPr marL="142875" indent="0">
-              <a:buNone/>
-              <a:defRPr sz="438"/>
+            <a:lvl2pPr marL="180045" indent="0">
+              <a:buNone/>
+              <a:defRPr sz="551"/>
             </a:lvl2pPr>
-            <a:lvl3pPr marL="285750" indent="0">
-              <a:buNone/>
-              <a:defRPr sz="375"/>
+            <a:lvl3pPr marL="360091" indent="0">
+              <a:buNone/>
+              <a:defRPr sz="473"/>
             </a:lvl3pPr>
-            <a:lvl4pPr marL="428625" indent="0">
-              <a:buNone/>
-              <a:defRPr sz="313"/>
+            <a:lvl4pPr marL="540136" indent="0">
+              <a:buNone/>
+              <a:defRPr sz="394"/>
             </a:lvl4pPr>
-            <a:lvl5pPr marL="571500" indent="0">
-              <a:buNone/>
-              <a:defRPr sz="313"/>
+            <a:lvl5pPr marL="720181" indent="0">
+              <a:buNone/>
+              <a:defRPr sz="394"/>
             </a:lvl5pPr>
-            <a:lvl6pPr marL="714375" indent="0">
-              <a:buNone/>
-              <a:defRPr sz="313"/>
+            <a:lvl6pPr marL="900227" indent="0">
+              <a:buNone/>
+              <a:defRPr sz="394"/>
             </a:lvl6pPr>
-            <a:lvl7pPr marL="857250" indent="0">
-              <a:buNone/>
-              <a:defRPr sz="313"/>
+            <a:lvl7pPr marL="1080272" indent="0">
+              <a:buNone/>
+              <a:defRPr sz="394"/>
             </a:lvl7pPr>
-            <a:lvl8pPr marL="1000125" indent="0">
-              <a:buNone/>
-              <a:defRPr sz="313"/>
+            <a:lvl8pPr marL="1260318" indent="0">
+              <a:buNone/>
+              <a:defRPr sz="394"/>
             </a:lvl8pPr>
-            <a:lvl9pPr marL="1143000" indent="0">
-              <a:buNone/>
-              <a:defRPr sz="313"/>
+            <a:lvl9pPr marL="1440363" indent="0">
+              <a:buNone/>
+              <a:defRPr sz="394"/>
             </a:lvl9pPr>
           </a:lstStyle>
           <a:p>
@@ -2348,7 +2353,7 @@
           <a:p>
             <a:fld id="{5389BAA2-ACBC-4759-A821-F5A5AC4AC9AB}" type="datetimeFigureOut">
               <a:rPr lang="en-US" smtClean="0"/>
-              <a:t>9/9/2018</a:t>
+              <a:t>9/26/2018</a:t>
             </a:fld>
             <a:endParaRPr lang="en-US"/>
           </a:p>
@@ -2399,7 +2404,7 @@
     </p:spTree>
     <p:extLst>
       <p:ext uri="{BB962C8B-B14F-4D97-AF65-F5344CB8AC3E}">
-        <p14:creationId xmlns:p14="http://schemas.microsoft.com/office/powerpoint/2010/main" val="2949117995"/>
+        <p14:creationId xmlns:p14="http://schemas.microsoft.com/office/powerpoint/2010/main" val="2749534182"/>
       </p:ext>
     </p:extLst>
   </p:cSld>
@@ -2443,8 +2448,8 @@
         </p:nvSpPr>
         <p:spPr>
           <a:xfrm>
-            <a:off x="196453" y="152136"/>
-            <a:ext cx="2464594" cy="552318"/>
+            <a:off x="247531" y="191691"/>
+            <a:ext cx="3105388" cy="695921"/>
           </a:xfrm>
           <a:prstGeom prst="rect">
             <a:avLst/>
@@ -2476,8 +2481,8 @@
         </p:nvSpPr>
         <p:spPr>
           <a:xfrm>
-            <a:off x="196453" y="760677"/>
-            <a:ext cx="2464594" cy="1813058"/>
+            <a:off x="247531" y="958453"/>
+            <a:ext cx="3105388" cy="2284452"/>
           </a:xfrm>
           <a:prstGeom prst="rect">
             <a:avLst/>
@@ -2538,8 +2543,8 @@
         </p:nvSpPr>
         <p:spPr>
           <a:xfrm>
-            <a:off x="196453" y="2648480"/>
-            <a:ext cx="642938" cy="152135"/>
+            <a:off x="247531" y="3337084"/>
+            <a:ext cx="810101" cy="191691"/>
           </a:xfrm>
           <a:prstGeom prst="rect">
             <a:avLst/>
@@ -2549,7 +2554,7 @@
           <a:bodyPr vert="horz" lIns="91440" tIns="45720" rIns="91440" bIns="45720" rtlCol="0" anchor="ctr"/>
           <a:lstStyle>
             <a:lvl1pPr algn="l">
-              <a:defRPr sz="375">
+              <a:defRPr sz="473">
                 <a:solidFill>
                   <a:schemeClr val="tx1">
                     <a:tint val="75000"/>
@@ -2561,7 +2566,7 @@
           <a:p>
             <a:fld id="{5389BAA2-ACBC-4759-A821-F5A5AC4AC9AB}" type="datetimeFigureOut">
               <a:rPr lang="en-US" smtClean="0"/>
-              <a:t>9/9/2018</a:t>
+              <a:t>9/26/2018</a:t>
             </a:fld>
             <a:endParaRPr lang="en-US"/>
           </a:p>
@@ -2579,8 +2584,8 @@
         </p:nvSpPr>
         <p:spPr>
           <a:xfrm>
-            <a:off x="946547" y="2648480"/>
-            <a:ext cx="964406" cy="152135"/>
+            <a:off x="1192649" y="3337084"/>
+            <a:ext cx="1215152" cy="191691"/>
           </a:xfrm>
           <a:prstGeom prst="rect">
             <a:avLst/>
@@ -2590,7 +2595,7 @@
           <a:bodyPr vert="horz" lIns="91440" tIns="45720" rIns="91440" bIns="45720" rtlCol="0" anchor="ctr"/>
           <a:lstStyle>
             <a:lvl1pPr algn="ctr">
-              <a:defRPr sz="375">
+              <a:defRPr sz="473">
                 <a:solidFill>
                   <a:schemeClr val="tx1">
                     <a:tint val="75000"/>
@@ -2616,8 +2621,8 @@
         </p:nvSpPr>
         <p:spPr>
           <a:xfrm>
-            <a:off x="2018109" y="2648480"/>
-            <a:ext cx="642938" cy="152135"/>
+            <a:off x="2542818" y="3337084"/>
+            <a:ext cx="810101" cy="191691"/>
           </a:xfrm>
           <a:prstGeom prst="rect">
             <a:avLst/>
@@ -2627,7 +2632,7 @@
           <a:bodyPr vert="horz" lIns="91440" tIns="45720" rIns="91440" bIns="45720" rtlCol="0" anchor="ctr"/>
           <a:lstStyle>
             <a:lvl1pPr algn="r">
-              <a:defRPr sz="375">
+              <a:defRPr sz="473">
                 <a:solidFill>
                   <a:schemeClr val="tx1">
                     <a:tint val="75000"/>
@@ -2648,27 +2653,27 @@
     </p:spTree>
     <p:extLst>
       <p:ext uri="{BB962C8B-B14F-4D97-AF65-F5344CB8AC3E}">
-        <p14:creationId xmlns:p14="http://schemas.microsoft.com/office/powerpoint/2010/main" val="611313683"/>
+        <p14:creationId xmlns:p14="http://schemas.microsoft.com/office/powerpoint/2010/main" val="2305965069"/>
       </p:ext>
     </p:extLst>
   </p:cSld>
   <p:clrMap bg1="lt1" tx1="dk1" bg2="lt2" tx2="dk2" accent1="accent1" accent2="accent2" accent3="accent3" accent4="accent4" accent5="accent5" accent6="accent6" hlink="hlink" folHlink="folHlink"/>
   <p:sldLayoutIdLst>
-    <p:sldLayoutId id="2147483661" r:id="rId1"/>
-    <p:sldLayoutId id="2147483662" r:id="rId2"/>
-    <p:sldLayoutId id="2147483663" r:id="rId3"/>
-    <p:sldLayoutId id="2147483664" r:id="rId4"/>
-    <p:sldLayoutId id="2147483665" r:id="rId5"/>
-    <p:sldLayoutId id="2147483666" r:id="rId6"/>
-    <p:sldLayoutId id="2147483667" r:id="rId7"/>
-    <p:sldLayoutId id="2147483668" r:id="rId8"/>
-    <p:sldLayoutId id="2147483669" r:id="rId9"/>
-    <p:sldLayoutId id="2147483670" r:id="rId10"/>
-    <p:sldLayoutId id="2147483671" r:id="rId11"/>
+    <p:sldLayoutId id="2147483673" r:id="rId1"/>
+    <p:sldLayoutId id="2147483674" r:id="rId2"/>
+    <p:sldLayoutId id="2147483675" r:id="rId3"/>
+    <p:sldLayoutId id="2147483676" r:id="rId4"/>
+    <p:sldLayoutId id="2147483677" r:id="rId5"/>
+    <p:sldLayoutId id="2147483678" r:id="rId6"/>
+    <p:sldLayoutId id="2147483679" r:id="rId7"/>
+    <p:sldLayoutId id="2147483680" r:id="rId8"/>
+    <p:sldLayoutId id="2147483681" r:id="rId9"/>
+    <p:sldLayoutId id="2147483682" r:id="rId10"/>
+    <p:sldLayoutId id="2147483683" r:id="rId11"/>
   </p:sldLayoutIdLst>
   <p:txStyles>
     <p:titleStyle>
-      <a:lvl1pPr algn="l" defTabSz="285750" rtl="0" eaLnBrk="1" latinLnBrk="0" hangingPunct="1">
+      <a:lvl1pPr algn="l" defTabSz="360091" rtl="0" eaLnBrk="1" latinLnBrk="0" hangingPunct="1">
         <a:lnSpc>
           <a:spcPct val="90000"/>
         </a:lnSpc>
@@ -2676,7 +2681,7 @@
           <a:spcPct val="0"/>
         </a:spcBef>
         <a:buNone/>
-        <a:defRPr sz="1375" kern="1200">
+        <a:defRPr sz="1733" kern="1200">
           <a:solidFill>
             <a:schemeClr val="tx1"/>
           </a:solidFill>
@@ -2687,16 +2692,16 @@
       </a:lvl1pPr>
     </p:titleStyle>
     <p:bodyStyle>
-      <a:lvl1pPr marL="71438" indent="-71438" algn="l" defTabSz="285750" rtl="0" eaLnBrk="1" latinLnBrk="0" hangingPunct="1">
+      <a:lvl1pPr marL="90023" indent="-90023" algn="l" defTabSz="360091" rtl="0" eaLnBrk="1" latinLnBrk="0" hangingPunct="1">
         <a:lnSpc>
           <a:spcPct val="90000"/>
         </a:lnSpc>
         <a:spcBef>
-          <a:spcPts val="313"/>
+          <a:spcPts val="394"/>
         </a:spcBef>
         <a:buFont typeface="Arial" panose="020B0604020202020204" pitchFamily="34" charset="0"/>
         <a:buChar char="•"/>
-        <a:defRPr sz="875" kern="1200">
+        <a:defRPr sz="1103" kern="1200">
           <a:solidFill>
             <a:schemeClr val="tx1"/>
           </a:solidFill>
@@ -2705,16 +2710,16 @@
           <a:cs typeface="+mn-cs"/>
         </a:defRPr>
       </a:lvl1pPr>
-      <a:lvl2pPr marL="214313" indent="-71438" algn="l" defTabSz="285750" rtl="0" eaLnBrk="1" latinLnBrk="0" hangingPunct="1">
+      <a:lvl2pPr marL="270068" indent="-90023" algn="l" defTabSz="360091" rtl="0" eaLnBrk="1" latinLnBrk="0" hangingPunct="1">
         <a:lnSpc>
           <a:spcPct val="90000"/>
         </a:lnSpc>
         <a:spcBef>
-          <a:spcPts val="156"/>
+          <a:spcPts val="197"/>
         </a:spcBef>
         <a:buFont typeface="Arial" panose="020B0604020202020204" pitchFamily="34" charset="0"/>
         <a:buChar char="•"/>
-        <a:defRPr sz="750" kern="1200">
+        <a:defRPr sz="945" kern="1200">
           <a:solidFill>
             <a:schemeClr val="tx1"/>
           </a:solidFill>
@@ -2723,16 +2728,16 @@
           <a:cs typeface="+mn-cs"/>
         </a:defRPr>
       </a:lvl2pPr>
-      <a:lvl3pPr marL="357188" indent="-71438" algn="l" defTabSz="285750" rtl="0" eaLnBrk="1" latinLnBrk="0" hangingPunct="1">
+      <a:lvl3pPr marL="450113" indent="-90023" algn="l" defTabSz="360091" rtl="0" eaLnBrk="1" latinLnBrk="0" hangingPunct="1">
         <a:lnSpc>
           <a:spcPct val="90000"/>
         </a:lnSpc>
         <a:spcBef>
-          <a:spcPts val="156"/>
+          <a:spcPts val="197"/>
         </a:spcBef>
         <a:buFont typeface="Arial" panose="020B0604020202020204" pitchFamily="34" charset="0"/>
         <a:buChar char="•"/>
-        <a:defRPr sz="625" kern="1200">
+        <a:defRPr sz="788" kern="1200">
           <a:solidFill>
             <a:schemeClr val="tx1"/>
           </a:solidFill>
@@ -2741,16 +2746,16 @@
           <a:cs typeface="+mn-cs"/>
         </a:defRPr>
       </a:lvl3pPr>
-      <a:lvl4pPr marL="500063" indent="-71438" algn="l" defTabSz="285750" rtl="0" eaLnBrk="1" latinLnBrk="0" hangingPunct="1">
+      <a:lvl4pPr marL="630159" indent="-90023" algn="l" defTabSz="360091" rtl="0" eaLnBrk="1" latinLnBrk="0" hangingPunct="1">
         <a:lnSpc>
           <a:spcPct val="90000"/>
         </a:lnSpc>
         <a:spcBef>
-          <a:spcPts val="156"/>
+          <a:spcPts val="197"/>
         </a:spcBef>
         <a:buFont typeface="Arial" panose="020B0604020202020204" pitchFamily="34" charset="0"/>
         <a:buChar char="•"/>
-        <a:defRPr sz="563" kern="1200">
+        <a:defRPr sz="709" kern="1200">
           <a:solidFill>
             <a:schemeClr val="tx1"/>
           </a:solidFill>
@@ -2759,16 +2764,16 @@
           <a:cs typeface="+mn-cs"/>
         </a:defRPr>
       </a:lvl4pPr>
-      <a:lvl5pPr marL="642938" indent="-71438" algn="l" defTabSz="285750" rtl="0" eaLnBrk="1" latinLnBrk="0" hangingPunct="1">
+      <a:lvl5pPr marL="810204" indent="-90023" algn="l" defTabSz="360091" rtl="0" eaLnBrk="1" latinLnBrk="0" hangingPunct="1">
         <a:lnSpc>
           <a:spcPct val="90000"/>
         </a:lnSpc>
         <a:spcBef>
-          <a:spcPts val="156"/>
+          <a:spcPts val="197"/>
         </a:spcBef>
         <a:buFont typeface="Arial" panose="020B0604020202020204" pitchFamily="34" charset="0"/>
         <a:buChar char="•"/>
-        <a:defRPr sz="563" kern="1200">
+        <a:defRPr sz="709" kern="1200">
           <a:solidFill>
             <a:schemeClr val="tx1"/>
           </a:solidFill>
@@ -2777,16 +2782,16 @@
           <a:cs typeface="+mn-cs"/>
         </a:defRPr>
       </a:lvl5pPr>
-      <a:lvl6pPr marL="785813" indent="-71438" algn="l" defTabSz="285750" rtl="0" eaLnBrk="1" latinLnBrk="0" hangingPunct="1">
+      <a:lvl6pPr marL="990249" indent="-90023" algn="l" defTabSz="360091" rtl="0" eaLnBrk="1" latinLnBrk="0" hangingPunct="1">
         <a:lnSpc>
           <a:spcPct val="90000"/>
         </a:lnSpc>
         <a:spcBef>
-          <a:spcPts val="156"/>
+          <a:spcPts val="197"/>
         </a:spcBef>
         <a:buFont typeface="Arial" panose="020B0604020202020204" pitchFamily="34" charset="0"/>
         <a:buChar char="•"/>
-        <a:defRPr sz="563" kern="1200">
+        <a:defRPr sz="709" kern="1200">
           <a:solidFill>
             <a:schemeClr val="tx1"/>
           </a:solidFill>
@@ -2795,16 +2800,16 @@
           <a:cs typeface="+mn-cs"/>
         </a:defRPr>
       </a:lvl6pPr>
-      <a:lvl7pPr marL="928688" indent="-71438" algn="l" defTabSz="285750" rtl="0" eaLnBrk="1" latinLnBrk="0" hangingPunct="1">
+      <a:lvl7pPr marL="1170295" indent="-90023" algn="l" defTabSz="360091" rtl="0" eaLnBrk="1" latinLnBrk="0" hangingPunct="1">
         <a:lnSpc>
           <a:spcPct val="90000"/>
         </a:lnSpc>
         <a:spcBef>
-          <a:spcPts val="156"/>
+          <a:spcPts val="197"/>
         </a:spcBef>
         <a:buFont typeface="Arial" panose="020B0604020202020204" pitchFamily="34" charset="0"/>
         <a:buChar char="•"/>
-        <a:defRPr sz="563" kern="1200">
+        <a:defRPr sz="709" kern="1200">
           <a:solidFill>
             <a:schemeClr val="tx1"/>
           </a:solidFill>
@@ -2813,16 +2818,16 @@
           <a:cs typeface="+mn-cs"/>
         </a:defRPr>
       </a:lvl7pPr>
-      <a:lvl8pPr marL="1071563" indent="-71438" algn="l" defTabSz="285750" rtl="0" eaLnBrk="1" latinLnBrk="0" hangingPunct="1">
+      <a:lvl8pPr marL="1350340" indent="-90023" algn="l" defTabSz="360091" rtl="0" eaLnBrk="1" latinLnBrk="0" hangingPunct="1">
         <a:lnSpc>
           <a:spcPct val="90000"/>
         </a:lnSpc>
         <a:spcBef>
-          <a:spcPts val="156"/>
+          <a:spcPts val="197"/>
         </a:spcBef>
         <a:buFont typeface="Arial" panose="020B0604020202020204" pitchFamily="34" charset="0"/>
         <a:buChar char="•"/>
-        <a:defRPr sz="563" kern="1200">
+        <a:defRPr sz="709" kern="1200">
           <a:solidFill>
             <a:schemeClr val="tx1"/>
           </a:solidFill>
@@ -2831,16 +2836,16 @@
           <a:cs typeface="+mn-cs"/>
         </a:defRPr>
       </a:lvl8pPr>
-      <a:lvl9pPr marL="1214438" indent="-71438" algn="l" defTabSz="285750" rtl="0" eaLnBrk="1" latinLnBrk="0" hangingPunct="1">
+      <a:lvl9pPr marL="1530386" indent="-90023" algn="l" defTabSz="360091" rtl="0" eaLnBrk="1" latinLnBrk="0" hangingPunct="1">
         <a:lnSpc>
           <a:spcPct val="90000"/>
         </a:lnSpc>
         <a:spcBef>
-          <a:spcPts val="156"/>
+          <a:spcPts val="197"/>
         </a:spcBef>
         <a:buFont typeface="Arial" panose="020B0604020202020204" pitchFamily="34" charset="0"/>
         <a:buChar char="•"/>
-        <a:defRPr sz="563" kern="1200">
+        <a:defRPr sz="709" kern="1200">
           <a:solidFill>
             <a:schemeClr val="tx1"/>
           </a:solidFill>
@@ -2854,8 +2859,8 @@
       <a:defPPr>
         <a:defRPr lang="en-US"/>
       </a:defPPr>
-      <a:lvl1pPr marL="0" algn="l" defTabSz="285750" rtl="0" eaLnBrk="1" latinLnBrk="0" hangingPunct="1">
-        <a:defRPr sz="563" kern="1200">
+      <a:lvl1pPr marL="0" algn="l" defTabSz="360091" rtl="0" eaLnBrk="1" latinLnBrk="0" hangingPunct="1">
+        <a:defRPr sz="709" kern="1200">
           <a:solidFill>
             <a:schemeClr val="tx1"/>
           </a:solidFill>
@@ -2864,8 +2869,8 @@
           <a:cs typeface="+mn-cs"/>
         </a:defRPr>
       </a:lvl1pPr>
-      <a:lvl2pPr marL="142875" algn="l" defTabSz="285750" rtl="0" eaLnBrk="1" latinLnBrk="0" hangingPunct="1">
-        <a:defRPr sz="563" kern="1200">
+      <a:lvl2pPr marL="180045" algn="l" defTabSz="360091" rtl="0" eaLnBrk="1" latinLnBrk="0" hangingPunct="1">
+        <a:defRPr sz="709" kern="1200">
           <a:solidFill>
             <a:schemeClr val="tx1"/>
           </a:solidFill>
@@ -2874,8 +2879,8 @@
           <a:cs typeface="+mn-cs"/>
         </a:defRPr>
       </a:lvl2pPr>
-      <a:lvl3pPr marL="285750" algn="l" defTabSz="285750" rtl="0" eaLnBrk="1" latinLnBrk="0" hangingPunct="1">
-        <a:defRPr sz="563" kern="1200">
+      <a:lvl3pPr marL="360091" algn="l" defTabSz="360091" rtl="0" eaLnBrk="1" latinLnBrk="0" hangingPunct="1">
+        <a:defRPr sz="709" kern="1200">
           <a:solidFill>
             <a:schemeClr val="tx1"/>
           </a:solidFill>
@@ -2884,8 +2889,8 @@
           <a:cs typeface="+mn-cs"/>
         </a:defRPr>
       </a:lvl3pPr>
-      <a:lvl4pPr marL="428625" algn="l" defTabSz="285750" rtl="0" eaLnBrk="1" latinLnBrk="0" hangingPunct="1">
-        <a:defRPr sz="563" kern="1200">
+      <a:lvl4pPr marL="540136" algn="l" defTabSz="360091" rtl="0" eaLnBrk="1" latinLnBrk="0" hangingPunct="1">
+        <a:defRPr sz="709" kern="1200">
           <a:solidFill>
             <a:schemeClr val="tx1"/>
           </a:solidFill>
@@ -2894,8 +2899,8 @@
           <a:cs typeface="+mn-cs"/>
         </a:defRPr>
       </a:lvl4pPr>
-      <a:lvl5pPr marL="571500" algn="l" defTabSz="285750" rtl="0" eaLnBrk="1" latinLnBrk="0" hangingPunct="1">
-        <a:defRPr sz="563" kern="1200">
+      <a:lvl5pPr marL="720181" algn="l" defTabSz="360091" rtl="0" eaLnBrk="1" latinLnBrk="0" hangingPunct="1">
+        <a:defRPr sz="709" kern="1200">
           <a:solidFill>
             <a:schemeClr val="tx1"/>
           </a:solidFill>
@@ -2904,8 +2909,8 @@
           <a:cs typeface="+mn-cs"/>
         </a:defRPr>
       </a:lvl5pPr>
-      <a:lvl6pPr marL="714375" algn="l" defTabSz="285750" rtl="0" eaLnBrk="1" latinLnBrk="0" hangingPunct="1">
-        <a:defRPr sz="563" kern="1200">
+      <a:lvl6pPr marL="900227" algn="l" defTabSz="360091" rtl="0" eaLnBrk="1" latinLnBrk="0" hangingPunct="1">
+        <a:defRPr sz="709" kern="1200">
           <a:solidFill>
             <a:schemeClr val="tx1"/>
           </a:solidFill>
@@ -2914,8 +2919,8 @@
           <a:cs typeface="+mn-cs"/>
         </a:defRPr>
       </a:lvl6pPr>
-      <a:lvl7pPr marL="857250" algn="l" defTabSz="285750" rtl="0" eaLnBrk="1" latinLnBrk="0" hangingPunct="1">
-        <a:defRPr sz="563" kern="1200">
+      <a:lvl7pPr marL="1080272" algn="l" defTabSz="360091" rtl="0" eaLnBrk="1" latinLnBrk="0" hangingPunct="1">
+        <a:defRPr sz="709" kern="1200">
           <a:solidFill>
             <a:schemeClr val="tx1"/>
           </a:solidFill>
@@ -2924,8 +2929,8 @@
           <a:cs typeface="+mn-cs"/>
         </a:defRPr>
       </a:lvl7pPr>
-      <a:lvl8pPr marL="1000125" algn="l" defTabSz="285750" rtl="0" eaLnBrk="1" latinLnBrk="0" hangingPunct="1">
-        <a:defRPr sz="563" kern="1200">
+      <a:lvl8pPr marL="1260318" algn="l" defTabSz="360091" rtl="0" eaLnBrk="1" latinLnBrk="0" hangingPunct="1">
+        <a:defRPr sz="709" kern="1200">
           <a:solidFill>
             <a:schemeClr val="tx1"/>
           </a:solidFill>
@@ -2934,8 +2939,8 @@
           <a:cs typeface="+mn-cs"/>
         </a:defRPr>
       </a:lvl8pPr>
-      <a:lvl9pPr marL="1143000" algn="l" defTabSz="285750" rtl="0" eaLnBrk="1" latinLnBrk="0" hangingPunct="1">
-        <a:defRPr sz="563" kern="1200">
+      <a:lvl9pPr marL="1440363" algn="l" defTabSz="360091" rtl="0" eaLnBrk="1" latinLnBrk="0" hangingPunct="1">
+        <a:defRPr sz="709" kern="1200">
           <a:solidFill>
             <a:schemeClr val="tx1"/>
           </a:solidFill>
@@ -2982,8 +2987,8 @@
         </p:nvSpPr>
         <p:spPr>
           <a:xfrm>
-            <a:off x="171450" y="454998"/>
-            <a:ext cx="2562225" cy="1246495"/>
+            <a:off x="216027" y="582479"/>
+            <a:ext cx="3228404" cy="1552220"/>
           </a:xfrm>
           <a:prstGeom prst="rect">
             <a:avLst/>
@@ -2998,11 +3003,11 @@
           <a:p>
             <a:pPr algn="ctr">
               <a:spcBef>
-                <a:spcPts val="600"/>
+                <a:spcPts val="756"/>
               </a:spcBef>
             </a:pPr>
             <a:r>
-              <a:rPr lang="en-US" sz="3700" b="1" kern="2000" spc="110" smtClean="0">
+              <a:rPr lang="en-US" sz="4662" b="1" kern="2000" spc="139">
                 <a:solidFill>
                   <a:schemeClr val="bg1"/>
                 </a:solidFill>
@@ -3012,7 +3017,7 @@
               <a:t>INOX</a:t>
             </a:r>
             <a:r>
-              <a:rPr lang="en-US" sz="3300" b="1" kern="2000" spc="110" smtClean="0">
+              <a:rPr lang="en-US" sz="4158" b="1" kern="2000" spc="139">
                 <a:solidFill>
                   <a:schemeClr val="bg1"/>
                 </a:solidFill>
@@ -3025,11 +3030,11 @@
           <a:p>
             <a:pPr algn="ctr">
               <a:spcBef>
-                <a:spcPts val="600"/>
+                <a:spcPts val="756"/>
               </a:spcBef>
             </a:pPr>
             <a:r>
-              <a:rPr lang="en-US" sz="3300" b="1" kern="2000" spc="110" smtClean="0">
+              <a:rPr lang="en-US" sz="4158" b="1" kern="2000" spc="139">
                 <a:solidFill>
                   <a:schemeClr val="bg1"/>
                 </a:solidFill>
@@ -3038,7 +3043,7 @@
               </a:rPr>
               <a:t>LINH KIÊN</a:t>
             </a:r>
-            <a:endParaRPr lang="en-US" sz="3300" b="1" kern="2000" spc="110">
+            <a:endParaRPr lang="en-US" sz="4158" b="1" kern="2000" spc="139">
               <a:solidFill>
                 <a:schemeClr val="bg1"/>
               </a:solidFill>
@@ -3056,8 +3061,8 @@
         </p:nvSpPr>
         <p:spPr>
           <a:xfrm>
-            <a:off x="171450" y="1861674"/>
-            <a:ext cx="2476500" cy="400110"/>
+            <a:off x="216027" y="2345709"/>
+            <a:ext cx="3120390" cy="480131"/>
           </a:xfrm>
           <a:prstGeom prst="rect">
             <a:avLst/>
@@ -3072,7 +3077,7 @@
           <a:p>
             <a:pPr algn="ctr"/>
             <a:r>
-              <a:rPr lang="en-US" sz="2000" b="1" smtClean="0">
+              <a:rPr lang="en-US" sz="2520" b="1">
                 <a:solidFill>
                   <a:schemeClr val="bg1"/>
                 </a:solidFill>
@@ -3081,7 +3086,7 @@
               </a:rPr>
               <a:t>Uy tín chất lượng</a:t>
             </a:r>
-            <a:endParaRPr lang="en-US" sz="2000" b="1">
+            <a:endParaRPr lang="en-US" sz="2520" b="1">
               <a:solidFill>
                 <a:schemeClr val="bg1"/>
               </a:solidFill>
@@ -3113,8 +3118,8 @@
         </p:blipFill>
         <p:spPr>
           <a:xfrm>
-            <a:off x="569610" y="1079136"/>
-            <a:ext cx="158400" cy="158400"/>
+            <a:off x="717709" y="1359711"/>
+            <a:ext cx="199584" cy="199584"/>
           </a:xfrm>
           <a:prstGeom prst="rect">
             <a:avLst/>
@@ -3143,8 +3148,8 @@
         </p:blipFill>
         <p:spPr>
           <a:xfrm>
-            <a:off x="1866900" y="1096275"/>
-            <a:ext cx="132842" cy="108000"/>
+            <a:off x="2352294" y="1381307"/>
+            <a:ext cx="167381" cy="136080"/>
           </a:xfrm>
           <a:prstGeom prst="rect">
             <a:avLst/>

</xml_diff>